<commit_message>
#15: Container comps are not react-agnostic
</commit_message>
<xml_diff>
--- a/docs/container-vs-component.pptx
+++ b/docs/container-vs-component.pptx
@@ -3451,8 +3451,8 @@
         </p:nvSpPr>
         <p:spPr>
           <a:xfrm>
-            <a:off x="4951657" y="1023072"/>
-            <a:ext cx="3429978" cy="523220"/>
+            <a:off x="5303485" y="1023072"/>
+            <a:ext cx="2726323" cy="523220"/>
           </a:xfrm>
           <a:prstGeom prst="rect">
             <a:avLst/>
@@ -3468,14 +3468,14 @@
             <a:pPr algn="ctr"/>
             <a:r>
               <a:rPr lang="en-CH" sz="1400" dirty="0"/>
-              <a:t>“Glue” to abstract over Redux state handling</a:t>
+              <a:t>Glue &amp; Logic</a:t>
             </a:r>
             <a:br>
               <a:rPr lang="en-CH" sz="1400" dirty="0"/>
             </a:br>
             <a:r>
               <a:rPr lang="en-CH" sz="1400" dirty="0"/>
-              <a:t>React-agnostic</a:t>
+              <a:t>Abstract over Redux state handling</a:t>
             </a:r>
           </a:p>
         </p:txBody>
@@ -4060,8 +4060,8 @@
         </p:nvSpPr>
         <p:spPr>
           <a:xfrm>
-            <a:off x="9530496" y="1023072"/>
-            <a:ext cx="1954574" cy="523220"/>
+            <a:off x="9754147" y="1023072"/>
+            <a:ext cx="1507272" cy="523220"/>
           </a:xfrm>
           <a:prstGeom prst="rect">
             <a:avLst/>
@@ -4077,7 +4077,7 @@
             <a:pPr algn="ctr"/>
             <a:r>
               <a:rPr lang="en-CH" sz="1400" dirty="0"/>
-              <a:t>Presentation-Only React</a:t>
+              <a:t>Presentation-Only</a:t>
             </a:r>
             <a:br>
               <a:rPr lang="en-CH" sz="1400" dirty="0"/>

</xml_diff>

<commit_message>
#15: Add details to presentation component
</commit_message>
<xml_diff>
--- a/docs/container-vs-component.pptx
+++ b/docs/container-vs-component.pptx
@@ -3361,8 +3361,8 @@
         </p:nvSpPr>
         <p:spPr>
           <a:xfrm>
-            <a:off x="4949375" y="1625598"/>
-            <a:ext cx="3573758" cy="3860800"/>
+            <a:off x="4775207" y="1625598"/>
+            <a:ext cx="3420000" cy="3860800"/>
           </a:xfrm>
           <a:prstGeom prst="rect">
             <a:avLst/>
@@ -3415,7 +3415,7 @@
         </p:nvSpPr>
         <p:spPr>
           <a:xfrm>
-            <a:off x="6176422" y="756308"/>
+            <a:off x="5932646" y="756308"/>
             <a:ext cx="1119665" cy="369332"/>
           </a:xfrm>
           <a:prstGeom prst="rect">
@@ -3451,7 +3451,7 @@
         </p:nvSpPr>
         <p:spPr>
           <a:xfrm>
-            <a:off x="5303485" y="1023072"/>
+            <a:off x="5129317" y="1023072"/>
             <a:ext cx="2726323" cy="523220"/>
           </a:xfrm>
           <a:prstGeom prst="rect">
@@ -3494,8 +3494,8 @@
         </p:nvSpPr>
         <p:spPr>
           <a:xfrm>
-            <a:off x="4980193" y="1748092"/>
-            <a:ext cx="3583032" cy="3816429"/>
+            <a:off x="4776997" y="1690036"/>
+            <a:ext cx="3583032" cy="3985706"/>
           </a:xfrm>
           <a:prstGeom prst="rect">
             <a:avLst/>
@@ -3514,7 +3514,7 @@
                 <a:ea typeface="Menlo" panose="020B0609030804020204" pitchFamily="49" charset="0"/>
                 <a:cs typeface="Menlo" panose="020B0609030804020204" pitchFamily="49" charset="0"/>
               </a:rPr>
-              <a:t>import { Button as ButtonComponent } ...</a:t>
+              <a:t>import { Button as ButtonComponent } ..</a:t>
             </a:r>
           </a:p>
           <a:p>
@@ -3574,17 +3574,33 @@
                 <a:ea typeface="Menlo" panose="020B0609030804020204" pitchFamily="49" charset="0"/>
                 <a:cs typeface="Menlo" panose="020B0609030804020204" pitchFamily="49" charset="0"/>
               </a:rPr>
-              <a:t>  const text =</a:t>
+              <a:t>  const text = </a:t>
+            </a:r>
+            <a:r>
+              <a:rPr lang="en-GB" sz="1100" dirty="0" err="1">
+                <a:latin typeface="Menlo" panose="020B0609030804020204" pitchFamily="49" charset="0"/>
+                <a:ea typeface="Menlo" panose="020B0609030804020204" pitchFamily="49" charset="0"/>
+                <a:cs typeface="Menlo" panose="020B0609030804020204" pitchFamily="49" charset="0"/>
+              </a:rPr>
+              <a:t>useSelector</a:t>
+            </a:r>
+            <a:r>
+              <a:rPr lang="en-GB" sz="1100" dirty="0">
+                <a:latin typeface="Menlo" panose="020B0609030804020204" pitchFamily="49" charset="0"/>
+                <a:ea typeface="Menlo" panose="020B0609030804020204" pitchFamily="49" charset="0"/>
+                <a:cs typeface="Menlo" panose="020B0609030804020204" pitchFamily="49" charset="0"/>
+              </a:rPr>
+              <a:t>(</a:t>
             </a:r>
             <a:br>
-              <a:rPr lang="en-CH" sz="1100" dirty="0">
+              <a:rPr lang="en-GB" sz="1100" dirty="0">
                 <a:latin typeface="Menlo" panose="020B0609030804020204" pitchFamily="49" charset="0"/>
                 <a:ea typeface="Menlo" panose="020B0609030804020204" pitchFamily="49" charset="0"/>
                 <a:cs typeface="Menlo" panose="020B0609030804020204" pitchFamily="49" charset="0"/>
               </a:rPr>
             </a:br>
             <a:r>
-              <a:rPr lang="en-CH" sz="1100" dirty="0">
+              <a:rPr lang="en-GB" sz="1100" dirty="0">
                 <a:latin typeface="Menlo" panose="020B0609030804020204" pitchFamily="49" charset="0"/>
                 <a:ea typeface="Menlo" panose="020B0609030804020204" pitchFamily="49" charset="0"/>
                 <a:cs typeface="Menlo" panose="020B0609030804020204" pitchFamily="49" charset="0"/>
@@ -3592,36 +3608,57 @@
               <a:t>    </a:t>
             </a:r>
             <a:r>
+              <a:rPr lang="en-GB" sz="1100" b="1" dirty="0">
+                <a:solidFill>
+                  <a:srgbClr val="7030A0"/>
+                </a:solidFill>
+                <a:latin typeface="Menlo" panose="020B0609030804020204" pitchFamily="49" charset="0"/>
+                <a:ea typeface="Menlo" panose="020B0609030804020204" pitchFamily="49" charset="0"/>
+                <a:cs typeface="Menlo" panose="020B0609030804020204" pitchFamily="49" charset="0"/>
+              </a:rPr>
+              <a:t>state</a:t>
+            </a:r>
+            <a:r>
+              <a:rPr lang="en-GB" sz="1100" dirty="0">
+                <a:latin typeface="Menlo" panose="020B0609030804020204" pitchFamily="49" charset="0"/>
+                <a:ea typeface="Menlo" panose="020B0609030804020204" pitchFamily="49" charset="0"/>
+                <a:cs typeface="Menlo" panose="020B0609030804020204" pitchFamily="49" charset="0"/>
+              </a:rPr>
+              <a:t> =&gt; </a:t>
+            </a:r>
+            <a:r>
+              <a:rPr lang="en-GB" sz="1100" b="1" dirty="0" err="1">
+                <a:solidFill>
+                  <a:srgbClr val="7030A0"/>
+                </a:solidFill>
+                <a:latin typeface="Menlo" panose="020B0609030804020204" pitchFamily="49" charset="0"/>
+                <a:ea typeface="Menlo" panose="020B0609030804020204" pitchFamily="49" charset="0"/>
+                <a:cs typeface="Menlo" panose="020B0609030804020204" pitchFamily="49" charset="0"/>
+              </a:rPr>
+              <a:t>state</a:t>
+            </a:r>
+            <a:r>
               <a:rPr lang="en-GB" sz="1100" dirty="0" err="1">
                 <a:latin typeface="Menlo" panose="020B0609030804020204" pitchFamily="49" charset="0"/>
                 <a:ea typeface="Menlo" panose="020B0609030804020204" pitchFamily="49" charset="0"/>
                 <a:cs typeface="Menlo" panose="020B0609030804020204" pitchFamily="49" charset="0"/>
               </a:rPr>
-              <a:t>useSelector</a:t>
-            </a:r>
+              <a:t>.example.text</a:t>
+            </a:r>
+            <a:endParaRPr lang="en-GB" sz="1100" dirty="0">
+              <a:latin typeface="Menlo" panose="020B0609030804020204" pitchFamily="49" charset="0"/>
+              <a:ea typeface="Menlo" panose="020B0609030804020204" pitchFamily="49" charset="0"/>
+              <a:cs typeface="Menlo" panose="020B0609030804020204" pitchFamily="49" charset="0"/>
+            </a:endParaRPr>
+          </a:p>
+          <a:p>
             <a:r>
               <a:rPr lang="en-GB" sz="1100" dirty="0">
                 <a:latin typeface="Menlo" panose="020B0609030804020204" pitchFamily="49" charset="0"/>
                 <a:ea typeface="Menlo" panose="020B0609030804020204" pitchFamily="49" charset="0"/>
                 <a:cs typeface="Menlo" panose="020B0609030804020204" pitchFamily="49" charset="0"/>
               </a:rPr>
-              <a:t>(s =&gt; </a:t>
-            </a:r>
-            <a:r>
-              <a:rPr lang="en-GB" sz="1100" dirty="0" err="1">
-                <a:latin typeface="Menlo" panose="020B0609030804020204" pitchFamily="49" charset="0"/>
-                <a:ea typeface="Menlo" panose="020B0609030804020204" pitchFamily="49" charset="0"/>
-                <a:cs typeface="Menlo" panose="020B0609030804020204" pitchFamily="49" charset="0"/>
-              </a:rPr>
-              <a:t>s.example.text</a:t>
-            </a:r>
-            <a:r>
-              <a:rPr lang="en-GB" sz="1100" dirty="0">
-                <a:latin typeface="Menlo" panose="020B0609030804020204" pitchFamily="49" charset="0"/>
-                <a:ea typeface="Menlo" panose="020B0609030804020204" pitchFamily="49" charset="0"/>
-                <a:cs typeface="Menlo" panose="020B0609030804020204" pitchFamily="49" charset="0"/>
-              </a:rPr>
-              <a:t>)</a:t>
+              <a:t>  )</a:t>
             </a:r>
           </a:p>
           <a:p>
@@ -3970,8 +4007,8 @@
         </p:nvSpPr>
         <p:spPr>
           <a:xfrm>
-            <a:off x="9361715" y="1625598"/>
-            <a:ext cx="2350861" cy="3860800"/>
+            <a:off x="8427709" y="1625598"/>
+            <a:ext cx="3420000" cy="3860800"/>
           </a:xfrm>
           <a:prstGeom prst="rect">
             <a:avLst/>
@@ -4024,7 +4061,7 @@
         </p:nvSpPr>
         <p:spPr>
           <a:xfrm>
-            <a:off x="9855452" y="756308"/>
+            <a:off x="9485383" y="756308"/>
             <a:ext cx="1304653" cy="369332"/>
           </a:xfrm>
           <a:prstGeom prst="rect">
@@ -4060,7 +4097,7 @@
         </p:nvSpPr>
         <p:spPr>
           <a:xfrm>
-            <a:off x="9754147" y="1023072"/>
+            <a:off x="9384073" y="1023072"/>
             <a:ext cx="1507272" cy="523220"/>
           </a:xfrm>
           <a:prstGeom prst="rect">
@@ -4103,8 +4140,8 @@
         </p:nvSpPr>
         <p:spPr>
           <a:xfrm>
-            <a:off x="9422096" y="2183782"/>
-            <a:ext cx="2053767" cy="1954381"/>
+            <a:off x="8616395" y="2011925"/>
+            <a:ext cx="2733441" cy="2292935"/>
           </a:xfrm>
           <a:prstGeom prst="rect">
             <a:avLst/>
@@ -4118,27 +4155,12 @@
           <a:lstStyle/>
           <a:p>
             <a:r>
-              <a:rPr lang="en-CH" sz="1100" b="1" dirty="0">
-                <a:latin typeface="Menlo" panose="020B0609030804020204" pitchFamily="49" charset="0"/>
-                <a:ea typeface="Menlo" panose="020B0609030804020204" pitchFamily="49" charset="0"/>
-                <a:cs typeface="Menlo" panose="020B0609030804020204" pitchFamily="49" charset="0"/>
-              </a:rPr>
-              <a:t>Props</a:t>
-            </a:r>
-            <a:br>
               <a:rPr lang="en-CH" sz="1100" dirty="0">
                 <a:latin typeface="Menlo" panose="020B0609030804020204" pitchFamily="49" charset="0"/>
                 <a:ea typeface="Menlo" panose="020B0609030804020204" pitchFamily="49" charset="0"/>
                 <a:cs typeface="Menlo" panose="020B0609030804020204" pitchFamily="49" charset="0"/>
               </a:rPr>
-            </a:br>
-            <a:r>
-              <a:rPr lang="en-CH" sz="1100" dirty="0">
-                <a:latin typeface="Menlo" panose="020B0609030804020204" pitchFamily="49" charset="0"/>
-                <a:ea typeface="Menlo" panose="020B0609030804020204" pitchFamily="49" charset="0"/>
-                <a:cs typeface="Menlo" panose="020B0609030804020204" pitchFamily="49" charset="0"/>
-              </a:rPr>
-              <a:t>{</a:t>
+              <a:t>interface Props {</a:t>
             </a:r>
           </a:p>
           <a:p>
@@ -4187,15 +4209,19 @@
           </a:p>
           <a:p>
             <a:r>
-              <a:rPr lang="en-CH" sz="1100" b="1" dirty="0">
-                <a:latin typeface="Menlo" panose="020B0609030804020204" pitchFamily="49" charset="0"/>
-                <a:ea typeface="Menlo" panose="020B0609030804020204" pitchFamily="49" charset="0"/>
-                <a:cs typeface="Menlo" panose="020B0609030804020204" pitchFamily="49" charset="0"/>
-              </a:rPr>
-              <a:t>render</a:t>
-            </a:r>
-          </a:p>
-          <a:p>
+              <a:rPr lang="en-CH" sz="1100" dirty="0">
+                <a:solidFill>
+                  <a:schemeClr val="tx1">
+                    <a:lumMod val="50000"/>
+                    <a:lumOff val="50000"/>
+                  </a:schemeClr>
+                </a:solidFill>
+                <a:latin typeface="Menlo" panose="020B0609030804020204" pitchFamily="49" charset="0"/>
+                <a:ea typeface="Menlo" panose="020B0609030804020204" pitchFamily="49" charset="0"/>
+                <a:cs typeface="Menlo" panose="020B0609030804020204" pitchFamily="49" charset="0"/>
+              </a:rPr>
+              <a:t>// render</a:t>
+            </a:r>
             <a:endParaRPr lang="en-CH" sz="1100" b="1" dirty="0">
               <a:latin typeface="Menlo" panose="020B0609030804020204" pitchFamily="49" charset="0"/>
               <a:ea typeface="Menlo" panose="020B0609030804020204" pitchFamily="49" charset="0"/>
@@ -4209,7 +4235,7 @@
                 <a:ea typeface="Menlo" panose="020B0609030804020204" pitchFamily="49" charset="0"/>
                 <a:cs typeface="Menlo" panose="020B0609030804020204" pitchFamily="49" charset="0"/>
               </a:rPr>
-              <a:t>(props) =&gt;</a:t>
+              <a:t>const Button = </a:t>
             </a:r>
           </a:p>
           <a:p>
@@ -4219,7 +4245,52 @@
                 <a:ea typeface="Menlo" panose="020B0609030804020204" pitchFamily="49" charset="0"/>
                 <a:cs typeface="Menlo" panose="020B0609030804020204" pitchFamily="49" charset="0"/>
               </a:rPr>
-              <a:t>  &lt;button&gt;...&lt;/button&gt;</a:t>
+              <a:t>  ({ text, onClick}: Props) =&gt;</a:t>
+            </a:r>
+            <a:br>
+              <a:rPr lang="en-CH" sz="1100" dirty="0">
+                <a:latin typeface="Menlo" panose="020B0609030804020204" pitchFamily="49" charset="0"/>
+                <a:ea typeface="Menlo" panose="020B0609030804020204" pitchFamily="49" charset="0"/>
+                <a:cs typeface="Menlo" panose="020B0609030804020204" pitchFamily="49" charset="0"/>
+              </a:rPr>
+            </a:br>
+            <a:r>
+              <a:rPr lang="en-CH" sz="1100" dirty="0">
+                <a:latin typeface="Menlo" panose="020B0609030804020204" pitchFamily="49" charset="0"/>
+                <a:ea typeface="Menlo" panose="020B0609030804020204" pitchFamily="49" charset="0"/>
+                <a:cs typeface="Menlo" panose="020B0609030804020204" pitchFamily="49" charset="0"/>
+              </a:rPr>
+              <a:t>    (&lt;button</a:t>
+            </a:r>
+          </a:p>
+          <a:p>
+            <a:r>
+              <a:rPr lang="en-CH" sz="1100" dirty="0">
+                <a:latin typeface="Menlo" panose="020B0609030804020204" pitchFamily="49" charset="0"/>
+                <a:ea typeface="Menlo" panose="020B0609030804020204" pitchFamily="49" charset="0"/>
+                <a:cs typeface="Menlo" panose="020B0609030804020204" pitchFamily="49" charset="0"/>
+              </a:rPr>
+              <a:t>       onClick={onClick}&gt;</a:t>
+            </a:r>
+          </a:p>
+          <a:p>
+            <a:r>
+              <a:rPr lang="en-CH" sz="1100" dirty="0">
+                <a:latin typeface="Menlo" panose="020B0609030804020204" pitchFamily="49" charset="0"/>
+                <a:ea typeface="Menlo" panose="020B0609030804020204" pitchFamily="49" charset="0"/>
+                <a:cs typeface="Menlo" panose="020B0609030804020204" pitchFamily="49" charset="0"/>
+              </a:rPr>
+              <a:t>       {text}</a:t>
+            </a:r>
+          </a:p>
+          <a:p>
+            <a:r>
+              <a:rPr lang="en-CH" sz="1100" dirty="0">
+                <a:latin typeface="Menlo" panose="020B0609030804020204" pitchFamily="49" charset="0"/>
+                <a:ea typeface="Menlo" panose="020B0609030804020204" pitchFamily="49" charset="0"/>
+                <a:cs typeface="Menlo" panose="020B0609030804020204" pitchFamily="49" charset="0"/>
+              </a:rPr>
+              <a:t>     &lt;/button&gt;)</a:t>
             </a:r>
           </a:p>
         </p:txBody>
@@ -4507,7 +4578,7 @@
         </p:nvSpPr>
         <p:spPr>
           <a:xfrm>
-            <a:off x="5265595" y="5787176"/>
+            <a:off x="5091427" y="5787176"/>
             <a:ext cx="2941318" cy="307777"/>
           </a:xfrm>
           <a:prstGeom prst="rect">
@@ -4548,7 +4619,7 @@
         </p:nvSpPr>
         <p:spPr>
           <a:xfrm>
-            <a:off x="8993325" y="5787176"/>
+            <a:off x="8593889" y="5787176"/>
             <a:ext cx="3087640" cy="307777"/>
           </a:xfrm>
           <a:prstGeom prst="rect">

</xml_diff>